<commit_message>
Interface added on presentation
</commit_message>
<xml_diff>
--- a/Plan presentation.pptx
+++ b/Plan presentation.pptx
@@ -6,9 +6,11 @@
   </p:sldMasterIdLst>
   <p:sldIdLst>
     <p:sldId id="256" r:id="rId2"/>
-    <p:sldId id="260" r:id="rId3"/>
-    <p:sldId id="258" r:id="rId4"/>
-    <p:sldId id="259" r:id="rId5"/>
+    <p:sldId id="261" r:id="rId3"/>
+    <p:sldId id="262" r:id="rId4"/>
+    <p:sldId id="260" r:id="rId5"/>
+    <p:sldId id="258" r:id="rId6"/>
+    <p:sldId id="259" r:id="rId7"/>
   </p:sldIdLst>
   <p:sldSz cx="12192000" cy="6858000"/>
   <p:notesSz cx="6858000" cy="9144000"/>
@@ -3310,6 +3312,14 @@
 <file path=ppt/slides/slide1.xml><?xml version="1.0" encoding="utf-8"?>
 <p:sld xmlns:a="http://schemas.openxmlformats.org/drawingml/2006/main" xmlns:r="http://schemas.openxmlformats.org/officeDocument/2006/relationships" xmlns:p="http://schemas.openxmlformats.org/presentationml/2006/main">
   <p:cSld>
+    <p:bg>
+      <p:bgPr>
+        <a:solidFill>
+          <a:schemeClr val="tx1"/>
+        </a:solidFill>
+        <a:effectLst/>
+      </p:bgPr>
+    </p:bg>
     <p:spTree>
       <p:nvGrpSpPr>
         <p:cNvPr id="1" name=""/>
@@ -3324,6 +3334,104 @@
           <a:chExt cx="0" cy="0"/>
         </a:xfrm>
       </p:grpSpPr>
+      <p:pic>
+        <p:nvPicPr>
+          <p:cNvPr id="4" name="Espace réservé du contenu 4" descr="Une image contenant capture d’écran, graphisme, Graphique, Caractère coloré&#10;&#10;Description générée automatiquement">
+            <a:extLst>
+              <a:ext uri="{FF2B5EF4-FFF2-40B4-BE49-F238E27FC236}">
+                <a16:creationId xmlns:a16="http://schemas.microsoft.com/office/drawing/2014/main" id="{5C802DAF-26E4-C791-411D-DF11A7924FD4}"/>
+              </a:ext>
+            </a:extLst>
+          </p:cNvPr>
+          <p:cNvPicPr>
+            <a:picLocks noChangeAspect="1"/>
+          </p:cNvPicPr>
+          <p:nvPr/>
+        </p:nvPicPr>
+        <p:blipFill>
+          <a:blip r:embed="rId2">
+            <a:alphaModFix amt="70000"/>
+          </a:blip>
+          <a:srcRect/>
+          <a:stretch/>
+        </p:blipFill>
+        <p:spPr>
+          <a:xfrm>
+            <a:off x="20" y="10"/>
+            <a:ext cx="12191980" cy="6857990"/>
+          </a:xfrm>
+          <a:prstGeom prst="rect">
+            <a:avLst/>
+          </a:prstGeom>
+        </p:spPr>
+      </p:pic>
+      <p:sp>
+        <p:nvSpPr>
+          <p:cNvPr id="9" name="Rectangle 8">
+            <a:extLst>
+              <a:ext uri="{FF2B5EF4-FFF2-40B4-BE49-F238E27FC236}">
+                <a16:creationId xmlns:a16="http://schemas.microsoft.com/office/drawing/2014/main" id="{B4916930-E76E-4100-9DCF-4981566A372A}"/>
+              </a:ext>
+              <a:ext uri="{C183D7F6-B498-43B3-948B-1728B52AA6E4}">
+                <adec:decorative xmlns:adec="http://schemas.microsoft.com/office/drawing/2017/decorative" val="1"/>
+              </a:ext>
+            </a:extLst>
+          </p:cNvPr>
+          <p:cNvSpPr>
+            <a:spLocks noGrp="1" noRot="1" noChangeAspect="1" noMove="1" noResize="1" noEditPoints="1" noAdjustHandles="1" noChangeArrowheads="1" noChangeShapeType="1" noTextEdit="1"/>
+          </p:cNvSpPr>
+          <p:nvPr>
+            <p:extLst>
+              <p:ext uri="{386F3935-93C4-4BCD-93E2-E3B085C9AB24}">
+                <p16:designElem xmlns:p16="http://schemas.microsoft.com/office/powerpoint/2015/main" val="1"/>
+              </p:ext>
+            </p:extLst>
+          </p:nvPr>
+        </p:nvSpPr>
+        <p:spPr>
+          <a:xfrm>
+            <a:off x="1857375" y="1885950"/>
+            <a:ext cx="8505825" cy="3152775"/>
+          </a:xfrm>
+          <a:prstGeom prst="rect">
+            <a:avLst/>
+          </a:prstGeom>
+          <a:solidFill>
+            <a:schemeClr val="bg1">
+              <a:alpha val="75000"/>
+            </a:schemeClr>
+          </a:solidFill>
+          <a:ln w="63500" cmpd="dbl">
+            <a:solidFill>
+              <a:schemeClr val="bg1"/>
+            </a:solidFill>
+          </a:ln>
+        </p:spPr>
+        <p:style>
+          <a:lnRef idx="2">
+            <a:schemeClr val="accent1">
+              <a:shade val="50000"/>
+            </a:schemeClr>
+          </a:lnRef>
+          <a:fillRef idx="1">
+            <a:schemeClr val="accent1"/>
+          </a:fillRef>
+          <a:effectRef idx="0">
+            <a:schemeClr val="accent1"/>
+          </a:effectRef>
+          <a:fontRef idx="minor">
+            <a:schemeClr val="lt1"/>
+          </a:fontRef>
+        </p:style>
+        <p:txBody>
+          <a:bodyPr rtlCol="0" anchor="ctr"/>
+          <a:lstStyle/>
+          <a:p>
+            <a:pPr algn="ctr"/>
+            <a:endParaRPr lang="en-US"/>
+          </a:p>
+        </p:txBody>
+      </p:sp>
       <p:sp>
         <p:nvSpPr>
           <p:cNvPr id="2" name="Titre 1">
@@ -3340,56 +3448,29 @@
             <p:ph type="ctrTitle"/>
           </p:nvPr>
         </p:nvSpPr>
-        <p:spPr/>
-        <p:txBody>
-          <a:bodyPr/>
-          <a:lstStyle/>
-          <a:p>
-            <a:r>
-              <a:rPr lang="fr-FR" dirty="0"/>
-              <a:t>Playlist </a:t>
-            </a:r>
-            <a:r>
-              <a:rPr lang="fr-FR" dirty="0" err="1"/>
-              <a:t>Generator</a:t>
-            </a:r>
-            <a:r>
-              <a:rPr lang="fr-FR" dirty="0"/>
-              <a:t> </a:t>
-            </a:r>
-            <a:r>
-              <a:rPr lang="fr-FR" dirty="0" err="1"/>
-              <a:t>based</a:t>
-            </a:r>
-            <a:r>
-              <a:rPr lang="fr-FR" dirty="0"/>
-              <a:t> on keywords</a:t>
-            </a:r>
-          </a:p>
-        </p:txBody>
-      </p:sp>
-      <p:sp>
-        <p:nvSpPr>
-          <p:cNvPr id="3" name="Sous-titre 2">
-            <a:extLst>
-              <a:ext uri="{FF2B5EF4-FFF2-40B4-BE49-F238E27FC236}">
-                <a16:creationId xmlns:a16="http://schemas.microsoft.com/office/drawing/2014/main" id="{7EFE6E80-9FC7-8FFC-7BE0-C2F343F5F326}"/>
-              </a:ext>
-            </a:extLst>
-          </p:cNvPr>
-          <p:cNvSpPr>
-            <a:spLocks noGrp="1"/>
-          </p:cNvSpPr>
-          <p:nvPr>
-            <p:ph type="subTitle" idx="1"/>
-          </p:nvPr>
-        </p:nvSpPr>
-        <p:spPr/>
-        <p:txBody>
-          <a:bodyPr/>
-          <a:lstStyle/>
-          <a:p>
-            <a:endParaRPr lang="fr-FR"/>
+        <p:spPr>
+          <a:xfrm>
+            <a:off x="2276475" y="2247900"/>
+            <a:ext cx="7581900" cy="2514600"/>
+          </a:xfrm>
+        </p:spPr>
+        <p:txBody>
+          <a:bodyPr vert="horz" lIns="91440" tIns="45720" rIns="91440" bIns="45720" rtlCol="0" anchor="ctr">
+            <a:normAutofit/>
+          </a:bodyPr>
+          <a:lstStyle/>
+          <a:p>
+            <a:r>
+              <a:rPr lang="en-US" sz="6600" dirty="0">
+                <a:solidFill>
+                  <a:schemeClr val="tx1">
+                    <a:lumMod val="75000"/>
+                    <a:lumOff val="25000"/>
+                  </a:schemeClr>
+                </a:solidFill>
+              </a:rPr>
+              <a:t>Playlist Generator based on keywords</a:t>
+            </a:r>
           </a:p>
         </p:txBody>
       </p:sp>
@@ -3428,7 +3509,7 @@
           <p:cNvPr id="2" name="Titre 1">
             <a:extLst>
               <a:ext uri="{FF2B5EF4-FFF2-40B4-BE49-F238E27FC236}">
-                <a16:creationId xmlns:a16="http://schemas.microsoft.com/office/drawing/2014/main" id="{FB5701E3-E646-B5CC-E54F-0658285761FA}"/>
+                <a16:creationId xmlns:a16="http://schemas.microsoft.com/office/drawing/2014/main" id="{3F1A039C-EFFC-AC35-C5CC-BCAAA2770EAF}"/>
               </a:ext>
             </a:extLst>
           </p:cNvPr>
@@ -3444,60 +3525,43 @@
           <a:bodyPr/>
           <a:lstStyle/>
           <a:p>
-            <a:r>
-              <a:rPr lang="fr-FR" dirty="0"/>
-              <a:t>Motivation</a:t>
-            </a:r>
-          </a:p>
-        </p:txBody>
-      </p:sp>
-      <p:sp>
-        <p:nvSpPr>
-          <p:cNvPr id="3" name="Espace réservé du contenu 2">
-            <a:extLst>
-              <a:ext uri="{FF2B5EF4-FFF2-40B4-BE49-F238E27FC236}">
-                <a16:creationId xmlns:a16="http://schemas.microsoft.com/office/drawing/2014/main" id="{E9046142-4307-C6A7-8C61-C20EAEAB9DCC}"/>
-              </a:ext>
-            </a:extLst>
-          </p:cNvPr>
-          <p:cNvSpPr>
-            <a:spLocks noGrp="1"/>
-          </p:cNvSpPr>
+            <a:endParaRPr lang="fr-FR"/>
+          </a:p>
+        </p:txBody>
+      </p:sp>
+      <p:pic>
+        <p:nvPicPr>
+          <p:cNvPr id="5" name="Espace réservé du contenu 4" descr="Une image contenant capture d’écran, graphisme, Graphique, Caractère coloré&#10;&#10;Description générée automatiquement">
+            <a:extLst>
+              <a:ext uri="{FF2B5EF4-FFF2-40B4-BE49-F238E27FC236}">
+                <a16:creationId xmlns:a16="http://schemas.microsoft.com/office/drawing/2014/main" id="{357612E6-2F93-0AC2-936C-DBE4694D52F1}"/>
+              </a:ext>
+            </a:extLst>
+          </p:cNvPr>
+          <p:cNvPicPr>
+            <a:picLocks noGrp="1" noChangeAspect="1"/>
+          </p:cNvPicPr>
           <p:nvPr>
             <p:ph idx="1"/>
           </p:nvPr>
-        </p:nvSpPr>
-        <p:spPr/>
-        <p:txBody>
-          <a:bodyPr/>
-          <a:lstStyle/>
-          <a:p>
-            <a:r>
-              <a:rPr lang="fr-FR" dirty="0" err="1"/>
-              <a:t>Interested</a:t>
-            </a:r>
-            <a:r>
-              <a:rPr lang="fr-FR" dirty="0"/>
-              <a:t> in Machine Learning and AI </a:t>
-            </a:r>
-            <a:r>
-              <a:rPr lang="fr-FR" dirty="0" err="1"/>
-              <a:t>technology</a:t>
-            </a:r>
-            <a:endParaRPr lang="fr-FR"/>
-          </a:p>
-          <a:p>
-            <a:endParaRPr lang="fr-FR" dirty="0"/>
-          </a:p>
-          <a:p>
-            <a:endParaRPr lang="fr-FR" dirty="0"/>
-          </a:p>
-        </p:txBody>
-      </p:sp>
+        </p:nvPicPr>
+        <p:blipFill>
+          <a:blip r:embed="rId2"/>
+          <a:stretch>
+            <a:fillRect/>
+          </a:stretch>
+        </p:blipFill>
+        <p:spPr>
+          <a:xfrm>
+            <a:off x="0" y="-7938"/>
+            <a:ext cx="12192000" cy="6857999"/>
+          </a:xfrm>
+        </p:spPr>
+      </p:pic>
     </p:spTree>
     <p:extLst>
       <p:ext uri="{BB962C8B-B14F-4D97-AF65-F5344CB8AC3E}">
-        <p14:creationId xmlns:p14="http://schemas.microsoft.com/office/powerpoint/2010/main" val="2914752620"/>
+        <p14:creationId xmlns:p14="http://schemas.microsoft.com/office/powerpoint/2010/main" val="2286026793"/>
       </p:ext>
     </p:extLst>
   </p:cSld>
@@ -3529,6 +3593,324 @@
           <p:cNvPr id="2" name="Titre 1">
             <a:extLst>
               <a:ext uri="{FF2B5EF4-FFF2-40B4-BE49-F238E27FC236}">
+                <a16:creationId xmlns:a16="http://schemas.microsoft.com/office/drawing/2014/main" id="{D86E525B-03E8-7EC6-D73E-9CABC266DAFB}"/>
+              </a:ext>
+            </a:extLst>
+          </p:cNvPr>
+          <p:cNvSpPr>
+            <a:spLocks noGrp="1"/>
+          </p:cNvSpPr>
+          <p:nvPr>
+            <p:ph type="title"/>
+          </p:nvPr>
+        </p:nvSpPr>
+        <p:spPr/>
+        <p:txBody>
+          <a:bodyPr/>
+          <a:lstStyle/>
+          <a:p>
+            <a:endParaRPr lang="fr-FR"/>
+          </a:p>
+        </p:txBody>
+      </p:sp>
+      <p:pic>
+        <p:nvPicPr>
+          <p:cNvPr id="5" name="Espace réservé du contenu 4" descr="Une image contenant texte, capture d’écran, Police, conception&#10;&#10;Description générée automatiquement">
+            <a:extLst>
+              <a:ext uri="{FF2B5EF4-FFF2-40B4-BE49-F238E27FC236}">
+                <a16:creationId xmlns:a16="http://schemas.microsoft.com/office/drawing/2014/main" id="{C16AB5DC-32A6-B59E-AF1C-B7A88371E3DC}"/>
+              </a:ext>
+            </a:extLst>
+          </p:cNvPr>
+          <p:cNvPicPr>
+            <a:picLocks noGrp="1" noChangeAspect="1"/>
+          </p:cNvPicPr>
+          <p:nvPr>
+            <p:ph idx="1"/>
+          </p:nvPr>
+        </p:nvPicPr>
+        <p:blipFill>
+          <a:blip r:embed="rId2"/>
+          <a:stretch>
+            <a:fillRect/>
+          </a:stretch>
+        </p:blipFill>
+        <p:spPr>
+          <a:xfrm>
+            <a:off x="0" y="0"/>
+            <a:ext cx="12192000" cy="6858000"/>
+          </a:xfrm>
+        </p:spPr>
+      </p:pic>
+    </p:spTree>
+    <p:extLst>
+      <p:ext uri="{BB962C8B-B14F-4D97-AF65-F5344CB8AC3E}">
+        <p14:creationId xmlns:p14="http://schemas.microsoft.com/office/powerpoint/2010/main" val="716029582"/>
+      </p:ext>
+    </p:extLst>
+  </p:cSld>
+  <p:clrMapOvr>
+    <a:masterClrMapping/>
+  </p:clrMapOvr>
+</p:sld>
+</file>
+
+<file path=ppt/slides/slide4.xml><?xml version="1.0" encoding="utf-8"?>
+<p:sld xmlns:a="http://schemas.openxmlformats.org/drawingml/2006/main" xmlns:r="http://schemas.openxmlformats.org/officeDocument/2006/relationships" xmlns:p="http://schemas.openxmlformats.org/presentationml/2006/main">
+  <p:cSld>
+    <p:spTree>
+      <p:nvGrpSpPr>
+        <p:cNvPr id="1" name=""/>
+        <p:cNvGrpSpPr/>
+        <p:nvPr/>
+      </p:nvGrpSpPr>
+      <p:grpSpPr>
+        <a:xfrm>
+          <a:off x="0" y="0"/>
+          <a:ext cx="0" cy="0"/>
+          <a:chOff x="0" y="0"/>
+          <a:chExt cx="0" cy="0"/>
+        </a:xfrm>
+      </p:grpSpPr>
+      <p:sp>
+        <p:nvSpPr>
+          <p:cNvPr id="2" name="Titre 1">
+            <a:extLst>
+              <a:ext uri="{FF2B5EF4-FFF2-40B4-BE49-F238E27FC236}">
+                <a16:creationId xmlns:a16="http://schemas.microsoft.com/office/drawing/2014/main" id="{FB5701E3-E646-B5CC-E54F-0658285761FA}"/>
+              </a:ext>
+            </a:extLst>
+          </p:cNvPr>
+          <p:cNvSpPr>
+            <a:spLocks noGrp="1"/>
+          </p:cNvSpPr>
+          <p:nvPr>
+            <p:ph type="title"/>
+          </p:nvPr>
+        </p:nvSpPr>
+        <p:spPr/>
+        <p:txBody>
+          <a:bodyPr/>
+          <a:lstStyle/>
+          <a:p>
+            <a:r>
+              <a:rPr lang="fr-FR" dirty="0"/>
+              <a:t>Motivation</a:t>
+            </a:r>
+          </a:p>
+        </p:txBody>
+      </p:sp>
+      <p:sp>
+        <p:nvSpPr>
+          <p:cNvPr id="3" name="Espace réservé du contenu 2">
+            <a:extLst>
+              <a:ext uri="{FF2B5EF4-FFF2-40B4-BE49-F238E27FC236}">
+                <a16:creationId xmlns:a16="http://schemas.microsoft.com/office/drawing/2014/main" id="{E9046142-4307-C6A7-8C61-C20EAEAB9DCC}"/>
+              </a:ext>
+            </a:extLst>
+          </p:cNvPr>
+          <p:cNvSpPr>
+            <a:spLocks noGrp="1"/>
+          </p:cNvSpPr>
+          <p:nvPr>
+            <p:ph idx="1"/>
+          </p:nvPr>
+        </p:nvSpPr>
+        <p:spPr/>
+        <p:txBody>
+          <a:bodyPr/>
+          <a:lstStyle/>
+          <a:p>
+            <a:r>
+              <a:rPr lang="fr-FR" dirty="0" err="1"/>
+              <a:t>Interested</a:t>
+            </a:r>
+            <a:r>
+              <a:rPr lang="fr-FR" dirty="0"/>
+              <a:t> in Machine Learning and AI </a:t>
+            </a:r>
+            <a:r>
+              <a:rPr lang="fr-FR" dirty="0" err="1"/>
+              <a:t>technology</a:t>
+            </a:r>
+            <a:endParaRPr lang="fr-FR" dirty="0"/>
+          </a:p>
+          <a:p>
+            <a:r>
+              <a:rPr lang="fr-FR" dirty="0"/>
+              <a:t>Alternative (fun) </a:t>
+            </a:r>
+            <a:r>
+              <a:rPr lang="fr-FR" dirty="0" err="1"/>
+              <a:t>way</a:t>
+            </a:r>
+            <a:r>
+              <a:rPr lang="fr-FR" dirty="0"/>
+              <a:t> of </a:t>
+            </a:r>
+            <a:r>
+              <a:rPr lang="fr-FR" dirty="0" err="1"/>
+              <a:t>creating</a:t>
+            </a:r>
+            <a:r>
+              <a:rPr lang="fr-FR" dirty="0"/>
+              <a:t> playlist</a:t>
+            </a:r>
+          </a:p>
+          <a:p>
+            <a:r>
+              <a:rPr lang="fr-FR" dirty="0" err="1"/>
+              <a:t>Integrating</a:t>
+            </a:r>
+            <a:r>
+              <a:rPr lang="fr-FR" dirty="0"/>
+              <a:t> </a:t>
+            </a:r>
+            <a:r>
+              <a:rPr lang="fr-FR" dirty="0" err="1"/>
+              <a:t>interpretation</a:t>
+            </a:r>
+            <a:r>
+              <a:rPr lang="fr-FR" dirty="0"/>
+              <a:t> of the </a:t>
+            </a:r>
+            <a:r>
+              <a:rPr lang="fr-FR" dirty="0" err="1"/>
+              <a:t>word</a:t>
+            </a:r>
+            <a:r>
+              <a:rPr lang="fr-FR" dirty="0"/>
+              <a:t> and how </a:t>
+            </a:r>
+            <a:r>
+              <a:rPr lang="fr-FR" dirty="0" err="1"/>
+              <a:t>it</a:t>
+            </a:r>
+            <a:r>
+              <a:rPr lang="fr-FR" dirty="0"/>
+              <a:t> </a:t>
+            </a:r>
+            <a:r>
+              <a:rPr lang="fr-FR" dirty="0" err="1"/>
+              <a:t>represents</a:t>
+            </a:r>
+            <a:r>
+              <a:rPr lang="fr-FR" dirty="0"/>
+              <a:t> the </a:t>
+            </a:r>
+            <a:r>
+              <a:rPr lang="fr-FR" dirty="0" err="1"/>
+              <a:t>song</a:t>
+            </a:r>
+            <a:endParaRPr lang="fr-FR" dirty="0"/>
+          </a:p>
+          <a:p>
+            <a:endParaRPr lang="fr-FR" dirty="0"/>
+          </a:p>
+          <a:p>
+            <a:r>
+              <a:rPr lang="fr-FR" dirty="0"/>
+              <a:t>Meeting </a:t>
+            </a:r>
+            <a:r>
+              <a:rPr lang="fr-FR" dirty="0" err="1"/>
+              <a:t>every</a:t>
+            </a:r>
+            <a:r>
+              <a:rPr lang="fr-FR" dirty="0"/>
+              <a:t> </a:t>
+            </a:r>
+            <a:r>
+              <a:rPr lang="fr-FR" dirty="0" err="1"/>
+              <a:t>week</a:t>
+            </a:r>
+            <a:r>
+              <a:rPr lang="fr-FR" dirty="0"/>
+              <a:t> in </a:t>
+            </a:r>
+            <a:r>
+              <a:rPr lang="fr-FR" dirty="0" err="1"/>
+              <a:t>order</a:t>
+            </a:r>
+            <a:r>
+              <a:rPr lang="fr-FR" dirty="0"/>
+              <a:t> to </a:t>
+            </a:r>
+            <a:r>
+              <a:rPr lang="fr-FR" dirty="0" err="1"/>
+              <a:t>delegate</a:t>
+            </a:r>
+            <a:r>
+              <a:rPr lang="fr-FR" dirty="0"/>
+              <a:t> </a:t>
+            </a:r>
+            <a:r>
+              <a:rPr lang="fr-FR" dirty="0" err="1"/>
+              <a:t>tasks</a:t>
+            </a:r>
+            <a:r>
+              <a:rPr lang="fr-FR" dirty="0"/>
+              <a:t>, </a:t>
+            </a:r>
+            <a:r>
+              <a:rPr lang="fr-FR" dirty="0" err="1"/>
+              <a:t>track</a:t>
+            </a:r>
+            <a:r>
+              <a:rPr lang="fr-FR" dirty="0"/>
+              <a:t> </a:t>
+            </a:r>
+            <a:r>
+              <a:rPr lang="fr-FR" dirty="0" err="1"/>
+              <a:t>our</a:t>
+            </a:r>
+            <a:r>
+              <a:rPr lang="fr-FR" dirty="0"/>
+              <a:t> </a:t>
+            </a:r>
+            <a:r>
+              <a:rPr lang="fr-FR" dirty="0" err="1"/>
+              <a:t>progress</a:t>
+            </a:r>
+            <a:endParaRPr lang="fr-FR" dirty="0"/>
+          </a:p>
+        </p:txBody>
+      </p:sp>
+    </p:spTree>
+    <p:extLst>
+      <p:ext uri="{BB962C8B-B14F-4D97-AF65-F5344CB8AC3E}">
+        <p14:creationId xmlns:p14="http://schemas.microsoft.com/office/powerpoint/2010/main" val="2914752620"/>
+      </p:ext>
+    </p:extLst>
+  </p:cSld>
+  <p:clrMapOvr>
+    <a:masterClrMapping/>
+  </p:clrMapOvr>
+</p:sld>
+</file>
+
+<file path=ppt/slides/slide5.xml><?xml version="1.0" encoding="utf-8"?>
+<p:sld xmlns:a="http://schemas.openxmlformats.org/drawingml/2006/main" xmlns:r="http://schemas.openxmlformats.org/officeDocument/2006/relationships" xmlns:p="http://schemas.openxmlformats.org/presentationml/2006/main">
+  <p:cSld>
+    <p:spTree>
+      <p:nvGrpSpPr>
+        <p:cNvPr id="1" name=""/>
+        <p:cNvGrpSpPr/>
+        <p:nvPr/>
+      </p:nvGrpSpPr>
+      <p:grpSpPr>
+        <a:xfrm>
+          <a:off x="0" y="0"/>
+          <a:ext cx="0" cy="0"/>
+          <a:chOff x="0" y="0"/>
+          <a:chExt cx="0" cy="0"/>
+        </a:xfrm>
+      </p:grpSpPr>
+      <p:sp>
+        <p:nvSpPr>
+          <p:cNvPr id="2" name="Titre 1">
+            <a:extLst>
+              <a:ext uri="{FF2B5EF4-FFF2-40B4-BE49-F238E27FC236}">
                 <a16:creationId xmlns:a16="http://schemas.microsoft.com/office/drawing/2014/main" id="{CD5D9F07-D917-F41D-A67A-6BEC02FEF7FB}"/>
               </a:ext>
             </a:extLst>
@@ -3747,7 +4129,7 @@
 </p:sld>
 </file>
 
-<file path=ppt/slides/slide4.xml><?xml version="1.0" encoding="utf-8"?>
+<file path=ppt/slides/slide6.xml><?xml version="1.0" encoding="utf-8"?>
 <p:sld xmlns:a="http://schemas.openxmlformats.org/drawingml/2006/main" xmlns:r="http://schemas.openxmlformats.org/officeDocument/2006/relationships" xmlns:p="http://schemas.openxmlformats.org/presentationml/2006/main">
   <p:cSld>
     <p:spTree>

</xml_diff>